<commit_message>
Prototype changes and final improvements
</commit_message>
<xml_diff>
--- a/System Flowchart Overview.pptx
+++ b/System Flowchart Overview.pptx
@@ -255,7 +255,7 @@
           <a:p>
             <a:fld id="{DADBA2AD-6142-4BA0-AB5A-B3C62BB4A45F}" type="datetimeFigureOut">
               <a:rPr lang="en-GB" smtClean="0"/>
-              <a:t>18/02/2019</a:t>
+              <a:t>25/02/2019</a:t>
             </a:fld>
             <a:endParaRPr lang="en-GB"/>
           </a:p>
@@ -425,7 +425,7 @@
           <a:p>
             <a:fld id="{DADBA2AD-6142-4BA0-AB5A-B3C62BB4A45F}" type="datetimeFigureOut">
               <a:rPr lang="en-GB" smtClean="0"/>
-              <a:t>18/02/2019</a:t>
+              <a:t>25/02/2019</a:t>
             </a:fld>
             <a:endParaRPr lang="en-GB"/>
           </a:p>
@@ -605,7 +605,7 @@
           <a:p>
             <a:fld id="{DADBA2AD-6142-4BA0-AB5A-B3C62BB4A45F}" type="datetimeFigureOut">
               <a:rPr lang="en-GB" smtClean="0"/>
-              <a:t>18/02/2019</a:t>
+              <a:t>25/02/2019</a:t>
             </a:fld>
             <a:endParaRPr lang="en-GB"/>
           </a:p>
@@ -775,7 +775,7 @@
           <a:p>
             <a:fld id="{DADBA2AD-6142-4BA0-AB5A-B3C62BB4A45F}" type="datetimeFigureOut">
               <a:rPr lang="en-GB" smtClean="0"/>
-              <a:t>18/02/2019</a:t>
+              <a:t>25/02/2019</a:t>
             </a:fld>
             <a:endParaRPr lang="en-GB"/>
           </a:p>
@@ -1021,7 +1021,7 @@
           <a:p>
             <a:fld id="{DADBA2AD-6142-4BA0-AB5A-B3C62BB4A45F}" type="datetimeFigureOut">
               <a:rPr lang="en-GB" smtClean="0"/>
-              <a:t>18/02/2019</a:t>
+              <a:t>25/02/2019</a:t>
             </a:fld>
             <a:endParaRPr lang="en-GB"/>
           </a:p>
@@ -1253,7 +1253,7 @@
           <a:p>
             <a:fld id="{DADBA2AD-6142-4BA0-AB5A-B3C62BB4A45F}" type="datetimeFigureOut">
               <a:rPr lang="en-GB" smtClean="0"/>
-              <a:t>18/02/2019</a:t>
+              <a:t>25/02/2019</a:t>
             </a:fld>
             <a:endParaRPr lang="en-GB"/>
           </a:p>
@@ -1620,7 +1620,7 @@
           <a:p>
             <a:fld id="{DADBA2AD-6142-4BA0-AB5A-B3C62BB4A45F}" type="datetimeFigureOut">
               <a:rPr lang="en-GB" smtClean="0"/>
-              <a:t>18/02/2019</a:t>
+              <a:t>25/02/2019</a:t>
             </a:fld>
             <a:endParaRPr lang="en-GB"/>
           </a:p>
@@ -1738,7 +1738,7 @@
           <a:p>
             <a:fld id="{DADBA2AD-6142-4BA0-AB5A-B3C62BB4A45F}" type="datetimeFigureOut">
               <a:rPr lang="en-GB" smtClean="0"/>
-              <a:t>18/02/2019</a:t>
+              <a:t>25/02/2019</a:t>
             </a:fld>
             <a:endParaRPr lang="en-GB"/>
           </a:p>
@@ -1833,7 +1833,7 @@
           <a:p>
             <a:fld id="{DADBA2AD-6142-4BA0-AB5A-B3C62BB4A45F}" type="datetimeFigureOut">
               <a:rPr lang="en-GB" smtClean="0"/>
-              <a:t>18/02/2019</a:t>
+              <a:t>25/02/2019</a:t>
             </a:fld>
             <a:endParaRPr lang="en-GB"/>
           </a:p>
@@ -2110,7 +2110,7 @@
           <a:p>
             <a:fld id="{DADBA2AD-6142-4BA0-AB5A-B3C62BB4A45F}" type="datetimeFigureOut">
               <a:rPr lang="en-GB" smtClean="0"/>
-              <a:t>18/02/2019</a:t>
+              <a:t>25/02/2019</a:t>
             </a:fld>
             <a:endParaRPr lang="en-GB"/>
           </a:p>
@@ -2363,7 +2363,7 @@
           <a:p>
             <a:fld id="{DADBA2AD-6142-4BA0-AB5A-B3C62BB4A45F}" type="datetimeFigureOut">
               <a:rPr lang="en-GB" smtClean="0"/>
-              <a:t>18/02/2019</a:t>
+              <a:t>25/02/2019</a:t>
             </a:fld>
             <a:endParaRPr lang="en-GB"/>
           </a:p>
@@ -2576,7 +2576,7 @@
           <a:p>
             <a:fld id="{DADBA2AD-6142-4BA0-AB5A-B3C62BB4A45F}" type="datetimeFigureOut">
               <a:rPr lang="en-GB" smtClean="0"/>
-              <a:t>18/02/2019</a:t>
+              <a:t>25/02/2019</a:t>
             </a:fld>
             <a:endParaRPr lang="en-GB"/>
           </a:p>
@@ -3293,9 +3293,64 @@
                   <a:schemeClr val="tx1"/>
                 </a:solidFill>
               </a:rPr>
-              <a:t>View</a:t>
-            </a:r>
-          </a:p>
+              <a:t>Matches</a:t>
+            </a:r>
+            <a:endParaRPr lang="en-GB" dirty="0">
+              <a:solidFill>
+                <a:schemeClr val="tx1"/>
+              </a:solidFill>
+            </a:endParaRPr>
+          </a:p>
+        </p:txBody>
+      </p:sp>
+      <p:sp>
+        <p:nvSpPr>
+          <p:cNvPr id="9" name="Rectangle 8">
+            <a:extLst>
+              <a:ext uri="{FF2B5EF4-FFF2-40B4-BE49-F238E27FC236}">
+                <a16:creationId xmlns:a16="http://schemas.microsoft.com/office/drawing/2014/main" id="{B9063062-7218-4256-9C71-48C72D9F71F4}"/>
+              </a:ext>
+            </a:extLst>
+          </p:cNvPr>
+          <p:cNvSpPr/>
+          <p:nvPr/>
+        </p:nvSpPr>
+        <p:spPr>
+          <a:xfrm>
+            <a:off x="3571190" y="2402487"/>
+            <a:ext cx="764770" cy="498763"/>
+          </a:xfrm>
+          <a:prstGeom prst="rect">
+            <a:avLst/>
+          </a:prstGeom>
+          <a:solidFill>
+            <a:srgbClr val="FDA65F"/>
+          </a:solidFill>
+          <a:ln w="28575">
+            <a:solidFill>
+              <a:schemeClr val="tx1"/>
+            </a:solidFill>
+          </a:ln>
+        </p:spPr>
+        <p:style>
+          <a:lnRef idx="2">
+            <a:schemeClr val="accent1">
+              <a:shade val="50000"/>
+            </a:schemeClr>
+          </a:lnRef>
+          <a:fillRef idx="1">
+            <a:schemeClr val="accent1"/>
+          </a:fillRef>
+          <a:effectRef idx="0">
+            <a:schemeClr val="accent1"/>
+          </a:effectRef>
+          <a:fontRef idx="minor">
+            <a:schemeClr val="lt1"/>
+          </a:fontRef>
+        </p:style>
+        <p:txBody>
+          <a:bodyPr rtlCol="0" anchor="ctr"/>
+          <a:lstStyle/>
           <a:p>
             <a:pPr algn="ctr"/>
             <a:r>
@@ -3304,73 +3359,7 @@
                   <a:schemeClr val="tx1"/>
                 </a:solidFill>
               </a:rPr>
-              <a:t>Matches</a:t>
-            </a:r>
-            <a:endParaRPr lang="en-GB" dirty="0">
-              <a:solidFill>
-                <a:schemeClr val="tx1"/>
-              </a:solidFill>
-            </a:endParaRPr>
-          </a:p>
-        </p:txBody>
-      </p:sp>
-      <p:sp>
-        <p:nvSpPr>
-          <p:cNvPr id="9" name="Rectangle 8">
-            <a:extLst>
-              <a:ext uri="{FF2B5EF4-FFF2-40B4-BE49-F238E27FC236}">
-                <a16:creationId xmlns:a16="http://schemas.microsoft.com/office/drawing/2014/main" id="{B9063062-7218-4256-9C71-48C72D9F71F4}"/>
-              </a:ext>
-            </a:extLst>
-          </p:cNvPr>
-          <p:cNvSpPr/>
-          <p:nvPr/>
-        </p:nvSpPr>
-        <p:spPr>
-          <a:xfrm>
-            <a:off x="3571190" y="2402487"/>
-            <a:ext cx="764770" cy="498763"/>
-          </a:xfrm>
-          <a:prstGeom prst="rect">
-            <a:avLst/>
-          </a:prstGeom>
-          <a:solidFill>
-            <a:srgbClr val="FDA65F"/>
-          </a:solidFill>
-          <a:ln w="28575">
-            <a:solidFill>
-              <a:schemeClr val="tx1"/>
-            </a:solidFill>
-          </a:ln>
-        </p:spPr>
-        <p:style>
-          <a:lnRef idx="2">
-            <a:schemeClr val="accent1">
-              <a:shade val="50000"/>
-            </a:schemeClr>
-          </a:lnRef>
-          <a:fillRef idx="1">
-            <a:schemeClr val="accent1"/>
-          </a:fillRef>
-          <a:effectRef idx="0">
-            <a:schemeClr val="accent1"/>
-          </a:effectRef>
-          <a:fontRef idx="minor">
-            <a:schemeClr val="lt1"/>
-          </a:fontRef>
-        </p:style>
-        <p:txBody>
-          <a:bodyPr rtlCol="0" anchor="ctr"/>
-          <a:lstStyle/>
-          <a:p>
-            <a:pPr algn="ctr"/>
-            <a:r>
-              <a:rPr lang="en-GB" sz="1100" dirty="0">
-                <a:solidFill>
-                  <a:schemeClr val="tx1"/>
-                </a:solidFill>
-              </a:rPr>
-              <a:t>View Trainings</a:t>
+              <a:t>Trainings</a:t>
             </a:r>
             <a:endParaRPr lang="en-GB" dirty="0">
               <a:solidFill>
@@ -3766,7 +3755,7 @@
                   <a:schemeClr val="tx1"/>
                 </a:solidFill>
               </a:rPr>
-              <a:t>Manage Users</a:t>
+              <a:t>Users</a:t>
             </a:r>
             <a:endParaRPr lang="en-GB" dirty="0">
               <a:solidFill>
@@ -3898,7 +3887,7 @@
                   <a:schemeClr val="tx1"/>
                 </a:solidFill>
               </a:rPr>
-              <a:t>Manage Leagues</a:t>
+              <a:t>Leagues</a:t>
             </a:r>
             <a:endParaRPr lang="en-GB" dirty="0">
               <a:solidFill>
@@ -4859,15 +4848,7 @@
                   <a:schemeClr val="tx1"/>
                 </a:solidFill>
               </a:rPr>
-              <a:t>Edit </a:t>
-            </a:r>
-            <a:r>
-              <a:rPr lang="en-GB" sz="1100" dirty="0" smtClean="0">
-                <a:solidFill>
-                  <a:schemeClr val="tx1"/>
-                </a:solidFill>
-              </a:rPr>
-              <a:t>Match</a:t>
+              <a:t>Edit Match</a:t>
             </a:r>
             <a:endParaRPr lang="en-GB" dirty="0">
               <a:solidFill>

</xml_diff>